<commit_message>
updated url to app
</commit_message>
<xml_diff>
--- a/Welcome presentation.pptx
+++ b/Welcome presentation.pptx
@@ -104,6 +104,11 @@
       </a:defRPr>
     </a:lvl9pPr>
   </p:defaultTextStyle>
+  <p:extLst>
+    <p:ext uri="{EFAFB233-063F-42B5-8137-9DF3F51BA10A}">
+      <p15:sldGuideLst xmlns:p15="http://schemas.microsoft.com/office/powerpoint/2012/main"/>
+    </p:ext>
+  </p:extLst>
 </p:presentation>
 </file>
 
@@ -3482,7 +3487,17 @@
             </a:pPr>
             <a:r>
               <a:rPr lang="en-IL" dirty="0"/>
-              <a:t>For your convinience, I deployed the app to streamlit (I’m sure you’re familier with it). I also included the non-streamlit version of the code, If you wish to test and debug it using a proper terminal.</a:t>
+              <a:t>For your convinience, I deployed </a:t>
+            </a:r>
+            <a:r>
+              <a:rPr lang="en-IL" dirty="0">
+                <a:hlinkClick r:id="rId3"/>
+              </a:rPr>
+              <a:t>the app </a:t>
+            </a:r>
+            <a:r>
+              <a:rPr lang="en-IL" dirty="0"/>
+              <a:t>to streamlit (I’m sure you’re familier with it). I also included the non-streamlit version of the code, If you wish to test and debug it using a proper terminal.</a:t>
             </a:r>
           </a:p>
           <a:p>

</xml_diff>